<commit_message>
[lectures] Second lecture slides minor fixes.
git-svn-id: https://mipt-mips.googlecode.com/svn@51 7b285467-9990-9c3a-2c35-738ad0b76374
</commit_message>
<xml_diff>
--- a/lectures/arch/Lecture_2__05_Oct__Project_Introduction__Eng_text__No_audio.pptx
+++ b/lectures/arch/Lecture_2__05_Oct__Project_Introduction__Eng_text__No_audio.pptx
@@ -5606,8 +5606,8 @@
         </p:nvSpPr>
         <p:spPr>
           <a:xfrm>
-            <a:off x="0" y="954244"/>
-            <a:ext cx="9055510" cy="5419661"/>
+            <a:off x="350635" y="954244"/>
+            <a:ext cx="8704875" cy="5419661"/>
           </a:xfrm>
         </p:spPr>
         <p:txBody>
@@ -5782,7 +5782,7 @@
                             </p:stCondLst>
                             <p:childTnLst>
                               <p:par>
-                                <p:cTn id="5" presetID="10" presetClass="entr" presetSubtype="0" fill="hold" nodeType="clickEffect">
+                                <p:cTn id="5" presetID="10" presetClass="entr" presetSubtype="0" fill="hold" grpId="0" nodeType="clickEffect">
                                   <p:stCondLst>
                                     <p:cond delay="0"/>
                                   </p:stCondLst>
@@ -5797,7 +5797,7 @@
                                         <p:tgtEl>
                                           <p:spTgt spid="3">
                                             <p:txEl>
-                                              <p:pRg st="1" end="1"/>
+                                              <p:pRg st="0" end="0"/>
                                             </p:txEl>
                                           </p:spTgt>
                                         </p:tgtEl>
@@ -5815,7 +5815,7 @@
                                         <p:tgtEl>
                                           <p:spTgt spid="3">
                                             <p:txEl>
-                                              <p:pRg st="1" end="1"/>
+                                              <p:pRg st="0" end="0"/>
                                             </p:txEl>
                                           </p:spTgt>
                                         </p:tgtEl>
@@ -5843,7 +5843,7 @@
                             </p:stCondLst>
                             <p:childTnLst>
                               <p:par>
-                                <p:cTn id="10" presetID="10" presetClass="entr" presetSubtype="0" fill="hold" nodeType="clickEffect">
+                                <p:cTn id="10" presetID="10" presetClass="entr" presetSubtype="0" fill="hold" grpId="0" nodeType="clickEffect">
                                   <p:stCondLst>
                                     <p:cond delay="0"/>
                                   </p:stCondLst>
@@ -5858,7 +5858,7 @@
                                         <p:tgtEl>
                                           <p:spTgt spid="3">
                                             <p:txEl>
-                                              <p:pRg st="0" end="0"/>
+                                              <p:pRg st="1" end="1"/>
                                             </p:txEl>
                                           </p:spTgt>
                                         </p:tgtEl>
@@ -5876,7 +5876,251 @@
                                         <p:tgtEl>
                                           <p:spTgt spid="3">
                                             <p:txEl>
-                                              <p:pRg st="0" end="0"/>
+                                              <p:pRg st="1" end="1"/>
+                                            </p:txEl>
+                                          </p:spTgt>
+                                        </p:tgtEl>
+                                      </p:cBhvr>
+                                    </p:animEffect>
+                                  </p:childTnLst>
+                                </p:cTn>
+                              </p:par>
+                            </p:childTnLst>
+                          </p:cTn>
+                        </p:par>
+                      </p:childTnLst>
+                    </p:cTn>
+                  </p:par>
+                  <p:par>
+                    <p:cTn id="13" fill="hold">
+                      <p:stCondLst>
+                        <p:cond delay="indefinite"/>
+                      </p:stCondLst>
+                      <p:childTnLst>
+                        <p:par>
+                          <p:cTn id="14" fill="hold">
+                            <p:stCondLst>
+                              <p:cond delay="0"/>
+                            </p:stCondLst>
+                            <p:childTnLst>
+                              <p:par>
+                                <p:cTn id="15" presetID="10" presetClass="entr" presetSubtype="0" fill="hold" grpId="0" nodeType="clickEffect">
+                                  <p:stCondLst>
+                                    <p:cond delay="0"/>
+                                  </p:stCondLst>
+                                  <p:childTnLst>
+                                    <p:set>
+                                      <p:cBhvr>
+                                        <p:cTn id="16" dur="1" fill="hold">
+                                          <p:stCondLst>
+                                            <p:cond delay="0"/>
+                                          </p:stCondLst>
+                                        </p:cTn>
+                                        <p:tgtEl>
+                                          <p:spTgt spid="3">
+                                            <p:txEl>
+                                              <p:pRg st="2" end="2"/>
+                                            </p:txEl>
+                                          </p:spTgt>
+                                        </p:tgtEl>
+                                        <p:attrNameLst>
+                                          <p:attrName>style.visibility</p:attrName>
+                                        </p:attrNameLst>
+                                      </p:cBhvr>
+                                      <p:to>
+                                        <p:strVal val="visible"/>
+                                      </p:to>
+                                    </p:set>
+                                    <p:animEffect transition="in" filter="fade">
+                                      <p:cBhvr>
+                                        <p:cTn id="17" dur="500"/>
+                                        <p:tgtEl>
+                                          <p:spTgt spid="3">
+                                            <p:txEl>
+                                              <p:pRg st="2" end="2"/>
+                                            </p:txEl>
+                                          </p:spTgt>
+                                        </p:tgtEl>
+                                      </p:cBhvr>
+                                    </p:animEffect>
+                                  </p:childTnLst>
+                                </p:cTn>
+                              </p:par>
+                            </p:childTnLst>
+                          </p:cTn>
+                        </p:par>
+                      </p:childTnLst>
+                    </p:cTn>
+                  </p:par>
+                  <p:par>
+                    <p:cTn id="18" fill="hold">
+                      <p:stCondLst>
+                        <p:cond delay="indefinite"/>
+                      </p:stCondLst>
+                      <p:childTnLst>
+                        <p:par>
+                          <p:cTn id="19" fill="hold">
+                            <p:stCondLst>
+                              <p:cond delay="0"/>
+                            </p:stCondLst>
+                            <p:childTnLst>
+                              <p:par>
+                                <p:cTn id="20" presetID="10" presetClass="entr" presetSubtype="0" fill="hold" grpId="0" nodeType="clickEffect">
+                                  <p:stCondLst>
+                                    <p:cond delay="0"/>
+                                  </p:stCondLst>
+                                  <p:childTnLst>
+                                    <p:set>
+                                      <p:cBhvr>
+                                        <p:cTn id="21" dur="1" fill="hold">
+                                          <p:stCondLst>
+                                            <p:cond delay="0"/>
+                                          </p:stCondLst>
+                                        </p:cTn>
+                                        <p:tgtEl>
+                                          <p:spTgt spid="3">
+                                            <p:txEl>
+                                              <p:pRg st="3" end="3"/>
+                                            </p:txEl>
+                                          </p:spTgt>
+                                        </p:tgtEl>
+                                        <p:attrNameLst>
+                                          <p:attrName>style.visibility</p:attrName>
+                                        </p:attrNameLst>
+                                      </p:cBhvr>
+                                      <p:to>
+                                        <p:strVal val="visible"/>
+                                      </p:to>
+                                    </p:set>
+                                    <p:animEffect transition="in" filter="fade">
+                                      <p:cBhvr>
+                                        <p:cTn id="22" dur="500"/>
+                                        <p:tgtEl>
+                                          <p:spTgt spid="3">
+                                            <p:txEl>
+                                              <p:pRg st="3" end="3"/>
+                                            </p:txEl>
+                                          </p:spTgt>
+                                        </p:tgtEl>
+                                      </p:cBhvr>
+                                    </p:animEffect>
+                                  </p:childTnLst>
+                                </p:cTn>
+                              </p:par>
+                            </p:childTnLst>
+                          </p:cTn>
+                        </p:par>
+                      </p:childTnLst>
+                    </p:cTn>
+                  </p:par>
+                  <p:par>
+                    <p:cTn id="23" fill="hold">
+                      <p:stCondLst>
+                        <p:cond delay="indefinite"/>
+                      </p:stCondLst>
+                      <p:childTnLst>
+                        <p:par>
+                          <p:cTn id="24" fill="hold">
+                            <p:stCondLst>
+                              <p:cond delay="0"/>
+                            </p:stCondLst>
+                            <p:childTnLst>
+                              <p:par>
+                                <p:cTn id="25" presetID="10" presetClass="entr" presetSubtype="0" fill="hold" grpId="0" nodeType="clickEffect">
+                                  <p:stCondLst>
+                                    <p:cond delay="0"/>
+                                  </p:stCondLst>
+                                  <p:childTnLst>
+                                    <p:set>
+                                      <p:cBhvr>
+                                        <p:cTn id="26" dur="1" fill="hold">
+                                          <p:stCondLst>
+                                            <p:cond delay="0"/>
+                                          </p:stCondLst>
+                                        </p:cTn>
+                                        <p:tgtEl>
+                                          <p:spTgt spid="3">
+                                            <p:txEl>
+                                              <p:pRg st="4" end="4"/>
+                                            </p:txEl>
+                                          </p:spTgt>
+                                        </p:tgtEl>
+                                        <p:attrNameLst>
+                                          <p:attrName>style.visibility</p:attrName>
+                                        </p:attrNameLst>
+                                      </p:cBhvr>
+                                      <p:to>
+                                        <p:strVal val="visible"/>
+                                      </p:to>
+                                    </p:set>
+                                    <p:animEffect transition="in" filter="fade">
+                                      <p:cBhvr>
+                                        <p:cTn id="27" dur="500"/>
+                                        <p:tgtEl>
+                                          <p:spTgt spid="3">
+                                            <p:txEl>
+                                              <p:pRg st="4" end="4"/>
+                                            </p:txEl>
+                                          </p:spTgt>
+                                        </p:tgtEl>
+                                      </p:cBhvr>
+                                    </p:animEffect>
+                                  </p:childTnLst>
+                                </p:cTn>
+                              </p:par>
+                            </p:childTnLst>
+                          </p:cTn>
+                        </p:par>
+                      </p:childTnLst>
+                    </p:cTn>
+                  </p:par>
+                  <p:par>
+                    <p:cTn id="28" fill="hold">
+                      <p:stCondLst>
+                        <p:cond delay="indefinite"/>
+                      </p:stCondLst>
+                      <p:childTnLst>
+                        <p:par>
+                          <p:cTn id="29" fill="hold">
+                            <p:stCondLst>
+                              <p:cond delay="0"/>
+                            </p:stCondLst>
+                            <p:childTnLst>
+                              <p:par>
+                                <p:cTn id="30" presetID="10" presetClass="entr" presetSubtype="0" fill="hold" grpId="0" nodeType="clickEffect">
+                                  <p:stCondLst>
+                                    <p:cond delay="0"/>
+                                  </p:stCondLst>
+                                  <p:childTnLst>
+                                    <p:set>
+                                      <p:cBhvr>
+                                        <p:cTn id="31" dur="1" fill="hold">
+                                          <p:stCondLst>
+                                            <p:cond delay="0"/>
+                                          </p:stCondLst>
+                                        </p:cTn>
+                                        <p:tgtEl>
+                                          <p:spTgt spid="3">
+                                            <p:txEl>
+                                              <p:pRg st="5" end="5"/>
+                                            </p:txEl>
+                                          </p:spTgt>
+                                        </p:tgtEl>
+                                        <p:attrNameLst>
+                                          <p:attrName>style.visibility</p:attrName>
+                                        </p:attrNameLst>
+                                      </p:cBhvr>
+                                      <p:to>
+                                        <p:strVal val="visible"/>
+                                      </p:to>
+                                    </p:set>
+                                    <p:animEffect transition="in" filter="fade">
+                                      <p:cBhvr>
+                                        <p:cTn id="32" dur="500"/>
+                                        <p:tgtEl>
+                                          <p:spTgt spid="3">
+                                            <p:txEl>
+                                              <p:pRg st="5" end="5"/>
                                             </p:txEl>
                                           </p:spTgt>
                                         </p:tgtEl>
@@ -5912,6 +6156,9 @@
         </p:cTn>
       </p:par>
     </p:tnLst>
+    <p:bldLst>
+      <p:bldP spid="3" grpId="0" build="p"/>
+    </p:bldLst>
   </p:timing>
 </p:sld>
 </file>
@@ -5969,8 +6216,8 @@
         </p:nvSpPr>
         <p:spPr>
           <a:xfrm>
-            <a:off x="0" y="954244"/>
-            <a:ext cx="9055510" cy="5419661"/>
+            <a:off x="405581" y="961618"/>
+            <a:ext cx="8605684" cy="5419661"/>
           </a:xfrm>
         </p:spPr>
         <p:txBody>
@@ -6839,8 +7086,8 @@
         </p:nvSpPr>
         <p:spPr>
           <a:xfrm>
-            <a:off x="0" y="954244"/>
-            <a:ext cx="9055510" cy="5419661"/>
+            <a:off x="265470" y="954244"/>
+            <a:ext cx="8790039" cy="5419661"/>
           </a:xfrm>
         </p:spPr>
         <p:txBody>
@@ -7377,8 +7624,8 @@
         </p:nvSpPr>
         <p:spPr>
           <a:xfrm>
-            <a:off x="0" y="954244"/>
-            <a:ext cx="9055510" cy="5419661"/>
+            <a:off x="250722" y="954244"/>
+            <a:ext cx="8804787" cy="5419661"/>
           </a:xfrm>
         </p:spPr>
         <p:txBody>
@@ -12671,24 +12918,6 @@
 </file>
 
 <file path=customXml/item1.xml><?xml version="1.0" encoding="utf-8"?>
-<?mso-contentType ?>
-<FormTemplates xmlns="http://schemas.microsoft.com/sharepoint/v3/contenttype/forms">
-  <Display>DocumentLibraryForm</Display>
-  <Edit>DocumentLibraryForm</Edit>
-  <New>DocumentLibraryForm</New>
-</FormTemplates>
-</file>
-
-<file path=customXml/item2.xml><?xml version="1.0" encoding="utf-8"?>
-<p:properties xmlns:p="http://schemas.microsoft.com/office/2006/metadata/properties" xmlns:xsi="http://www.w3.org/2001/XMLSchema-instance">
-  <documentManagement>
-    <PublishingExpirationDate xmlns="http://schemas.microsoft.com/sharepoint/v3" xsi:nil="true"/>
-    <PublishingStartDate xmlns="http://schemas.microsoft.com/sharepoint/v3" xsi:nil="true"/>
-  </documentManagement>
-</p:properties>
-</file>
-
-<file path=customXml/item3.xml><?xml version="1.0" encoding="utf-8"?>
 <ct:contentTypeSchema xmlns:ct="http://schemas.microsoft.com/office/2006/metadata/contentType" xmlns:ma="http://schemas.microsoft.com/office/2006/metadata/properties/metaAttributes" ct:_="" ma:_="" ma:contentTypeName="Document" ma:contentTypeID="0x0101006F401C71F511A342A8CE5D878AC6A5A2" ma:contentTypeVersion="1" ma:contentTypeDescription="Create a new document." ma:contentTypeScope="" ma:versionID="7780538ac0ddf0014d7399d2d91bbce0">
   <xsd:schema xmlns:xsd="http://www.w3.org/2001/XMLSchema" xmlns:p="http://schemas.microsoft.com/office/2006/metadata/properties" xmlns:ns1="http://schemas.microsoft.com/sharepoint/v3" targetNamespace="http://schemas.microsoft.com/office/2006/metadata/properties" ma:root="true" ma:fieldsID="ddb0c952b897a810c8a4e377cff6bff8" ns1:_="">
     <xsd:import namespace="http://schemas.microsoft.com/sharepoint/v3"/>
@@ -12754,30 +12983,25 @@
 </ct:contentTypeSchema>
 </file>
 
-<file path=customXml/itemProps1.xml><?xml version="1.0" encoding="utf-8"?>
-<ds:datastoreItem xmlns:ds="http://schemas.openxmlformats.org/officeDocument/2006/customXml" ds:itemID="{C5CC5FB6-44E0-47C0-972B-EBB94824D4B0}">
-  <ds:schemaRefs>
-    <ds:schemaRef ds:uri="http://schemas.microsoft.com/sharepoint/v3/contenttype/forms"/>
-  </ds:schemaRefs>
-</ds:datastoreItem>
+<file path=customXml/item2.xml><?xml version="1.0" encoding="utf-8"?>
+<p:properties xmlns:p="http://schemas.microsoft.com/office/2006/metadata/properties" xmlns:xsi="http://www.w3.org/2001/XMLSchema-instance">
+  <documentManagement>
+    <PublishingExpirationDate xmlns="http://schemas.microsoft.com/sharepoint/v3" xsi:nil="true"/>
+    <PublishingStartDate xmlns="http://schemas.microsoft.com/sharepoint/v3" xsi:nil="true"/>
+  </documentManagement>
+</p:properties>
 </file>
 
-<file path=customXml/itemProps2.xml><?xml version="1.0" encoding="utf-8"?>
-<ds:datastoreItem xmlns:ds="http://schemas.openxmlformats.org/officeDocument/2006/customXml" ds:itemID="{14A94C8E-3E2B-4AD9-8D67-7815198BE085}">
-  <ds:schemaRefs>
-    <ds:schemaRef ds:uri="http://schemas.openxmlformats.org/package/2006/metadata/core-properties"/>
-    <ds:schemaRef ds:uri="http://purl.org/dc/terms/"/>
-    <ds:schemaRef ds:uri="http://schemas.microsoft.com/office/2006/documentManagement/types"/>
-    <ds:schemaRef ds:uri="http://schemas.microsoft.com/office/2006/metadata/properties"/>
-    <ds:schemaRef ds:uri="http://www.w3.org/XML/1998/namespace"/>
-    <ds:schemaRef ds:uri="http://purl.org/dc/elements/1.1/"/>
-    <ds:schemaRef ds:uri="http://schemas.microsoft.com/sharepoint/v3"/>
-    <ds:schemaRef ds:uri="http://purl.org/dc/dcmitype/"/>
-  </ds:schemaRefs>
-</ds:datastoreItem>
+<file path=customXml/item3.xml><?xml version="1.0" encoding="utf-8"?>
+<?mso-contentType ?>
+<FormTemplates xmlns="http://schemas.microsoft.com/sharepoint/v3/contenttype/forms">
+  <Display>DocumentLibraryForm</Display>
+  <Edit>DocumentLibraryForm</Edit>
+  <New>DocumentLibraryForm</New>
+</FormTemplates>
 </file>
 
-<file path=customXml/itemProps3.xml><?xml version="1.0" encoding="utf-8"?>
+<file path=customXml/itemProps1.xml><?xml version="1.0" encoding="utf-8"?>
 <ds:datastoreItem xmlns:ds="http://schemas.openxmlformats.org/officeDocument/2006/customXml" ds:itemID="{82E76FF6-93BD-4804-AFC1-4178155785E4}">
   <ds:schemaRefs>
     <ds:schemaRef ds:uri="http://schemas.microsoft.com/office/2006/metadata/contentType"/>
@@ -12792,4 +13016,27 @@
     <ds:schemaRef ds:uri="http://schemas.microsoft.com/office/internal/2005/internalDocumentation"/>
   </ds:schemaRefs>
 </ds:datastoreItem>
+</file>
+
+<file path=customXml/itemProps2.xml><?xml version="1.0" encoding="utf-8"?>
+<ds:datastoreItem xmlns:ds="http://schemas.openxmlformats.org/officeDocument/2006/customXml" ds:itemID="{14A94C8E-3E2B-4AD9-8D67-7815198BE085}">
+  <ds:schemaRefs>
+    <ds:schemaRef ds:uri="http://www.w3.org/XML/1998/namespace"/>
+    <ds:schemaRef ds:uri="http://purl.org/dc/elements/1.1/"/>
+    <ds:schemaRef ds:uri="http://schemas.microsoft.com/sharepoint/v3"/>
+    <ds:schemaRef ds:uri="http://purl.org/dc/terms/"/>
+    <ds:schemaRef ds:uri="http://schemas.microsoft.com/office/2006/documentManagement/types"/>
+    <ds:schemaRef ds:uri="http://purl.org/dc/dcmitype/"/>
+    <ds:schemaRef ds:uri="http://schemas.openxmlformats.org/package/2006/metadata/core-properties"/>
+    <ds:schemaRef ds:uri="http://schemas.microsoft.com/office/2006/metadata/properties"/>
+  </ds:schemaRefs>
+</ds:datastoreItem>
+</file>
+
+<file path=customXml/itemProps3.xml><?xml version="1.0" encoding="utf-8"?>
+<ds:datastoreItem xmlns:ds="http://schemas.openxmlformats.org/officeDocument/2006/customXml" ds:itemID="{C5CC5FB6-44E0-47C0-972B-EBB94824D4B0}">
+  <ds:schemaRefs>
+    <ds:schemaRef ds:uri="http://schemas.microsoft.com/sharepoint/v3/contenttype/forms"/>
+  </ds:schemaRefs>
+</ds:datastoreItem>
 </file>
</xml_diff>